<commit_message>
update mocklist + PPP
</commit_message>
<xml_diff>
--- a/studies/labor study_A/script_labpilotpersonA.pptx
+++ b/studies/labor study_A/script_labpilotpersonA.pptx
@@ -10,8 +10,8 @@
     <p:sldId id="276" r:id="rId4"/>
     <p:sldId id="277" r:id="rId5"/>
     <p:sldId id="273" r:id="rId6"/>
-    <p:sldId id="307" r:id="rId7"/>
-    <p:sldId id="308" r:id="rId8"/>
+    <p:sldId id="309" r:id="rId7"/>
+    <p:sldId id="310" r:id="rId8"/>
     <p:sldId id="305" r:id="rId9"/>
     <p:sldId id="301" r:id="rId10"/>
     <p:sldId id="303" r:id="rId11"/>
@@ -348,7 +348,7 @@
             <a:fld id="{87DE6118-2437-4B30-8E3C-4D2BE6020583}" type="datetimeFigureOut">
               <a:rPr lang="en-US" smtClean="0"/>
               <a:pPr/>
-              <a:t>7/28/2020</a:t>
+              <a:t>8/3/2020</a:t>
             </a:fld>
             <a:endParaRPr lang="en-US" dirty="0"/>
           </a:p>
@@ -557,7 +557,7 @@
           <a:p>
             <a:fld id="{87DE6118-2437-4B30-8E3C-4D2BE6020583}" type="datetimeFigureOut">
               <a:rPr lang="en-US" smtClean="0"/>
-              <a:t>7/28/2020</a:t>
+              <a:t>8/3/2020</a:t>
             </a:fld>
             <a:endParaRPr lang="en-US" dirty="0"/>
           </a:p>
@@ -813,7 +813,7 @@
           <a:p>
             <a:fld id="{87DE6118-2437-4B30-8E3C-4D2BE6020583}" type="datetimeFigureOut">
               <a:rPr lang="en-US" smtClean="0"/>
-              <a:t>7/28/2020</a:t>
+              <a:t>8/3/2020</a:t>
             </a:fld>
             <a:endParaRPr lang="en-US" dirty="0"/>
           </a:p>
@@ -987,7 +987,7 @@
           <a:p>
             <a:fld id="{87DE6118-2437-4B30-8E3C-4D2BE6020583}" type="datetimeFigureOut">
               <a:rPr lang="en-US" smtClean="0"/>
-              <a:t>7/28/2020</a:t>
+              <a:t>8/3/2020</a:t>
             </a:fld>
             <a:endParaRPr lang="en-US" dirty="0"/>
           </a:p>
@@ -1331,7 +1331,7 @@
             <a:fld id="{87DE6118-2437-4B30-8E3C-4D2BE6020583}" type="datetimeFigureOut">
               <a:rPr lang="en-US" smtClean="0"/>
               <a:pPr/>
-              <a:t>7/28/2020</a:t>
+              <a:t>8/3/2020</a:t>
             </a:fld>
             <a:endParaRPr lang="en-US" dirty="0"/>
           </a:p>
@@ -1607,7 +1607,7 @@
           <a:p>
             <a:fld id="{87DE6118-2437-4B30-8E3C-4D2BE6020583}" type="datetimeFigureOut">
               <a:rPr lang="en-US" smtClean="0"/>
-              <a:t>7/28/2020</a:t>
+              <a:t>8/3/2020</a:t>
             </a:fld>
             <a:endParaRPr lang="en-US" dirty="0"/>
           </a:p>
@@ -1986,7 +1986,7 @@
           <a:p>
             <a:fld id="{87DE6118-2437-4B30-8E3C-4D2BE6020583}" type="datetimeFigureOut">
               <a:rPr lang="en-US" smtClean="0"/>
-              <a:t>7/28/2020</a:t>
+              <a:t>8/3/2020</a:t>
             </a:fld>
             <a:endParaRPr lang="en-US" dirty="0"/>
           </a:p>
@@ -2104,7 +2104,7 @@
           <a:p>
             <a:fld id="{87DE6118-2437-4B30-8E3C-4D2BE6020583}" type="datetimeFigureOut">
               <a:rPr lang="en-US" smtClean="0"/>
-              <a:t>7/28/2020</a:t>
+              <a:t>8/3/2020</a:t>
             </a:fld>
             <a:endParaRPr lang="en-US" dirty="0"/>
           </a:p>
@@ -2275,7 +2275,7 @@
           <a:p>
             <a:fld id="{87DE6118-2437-4B30-8E3C-4D2BE6020583}" type="datetimeFigureOut">
               <a:rPr lang="en-US" smtClean="0"/>
-              <a:t>7/28/2020</a:t>
+              <a:t>8/3/2020</a:t>
             </a:fld>
             <a:endParaRPr lang="en-US" dirty="0"/>
           </a:p>
@@ -2630,7 +2630,7 @@
             <a:fld id="{87DE6118-2437-4B30-8E3C-4D2BE6020583}" type="datetimeFigureOut">
               <a:rPr lang="en-US" smtClean="0"/>
               <a:pPr/>
-              <a:t>7/28/2020</a:t>
+              <a:t>8/3/2020</a:t>
             </a:fld>
             <a:endParaRPr lang="en-US" dirty="0"/>
           </a:p>
@@ -3014,7 +3014,7 @@
             <a:fld id="{87DE6118-2437-4B30-8E3C-4D2BE6020583}" type="datetimeFigureOut">
               <a:rPr lang="en-US" smtClean="0"/>
               <a:pPr/>
-              <a:t>7/28/2020</a:t>
+              <a:t>8/3/2020</a:t>
             </a:fld>
             <a:endParaRPr lang="en-US" dirty="0"/>
           </a:p>
@@ -3303,7 +3303,7 @@
             <a:fld id="{87DE6118-2437-4B30-8E3C-4D2BE6020583}" type="datetimeFigureOut">
               <a:rPr lang="en-US" smtClean="0"/>
               <a:pPr/>
-              <a:t>7/28/2020</a:t>
+              <a:t>8/3/2020</a:t>
             </a:fld>
             <a:endParaRPr lang="en-US" dirty="0"/>
           </a:p>
@@ -4219,8 +4219,8 @@
         </p:nvSpPr>
         <p:spPr>
           <a:xfrm>
-            <a:off x="1686785" y="1154202"/>
-            <a:ext cx="8361229" cy="3188848"/>
+            <a:off x="1206018" y="1173056"/>
+            <a:ext cx="9314295" cy="3188848"/>
           </a:xfrm>
         </p:spPr>
         <p:txBody>
@@ -4229,7 +4229,7 @@
           <a:p>
             <a:r>
               <a:rPr lang="de-DE" dirty="0"/>
-              <a:t>Unterrichts-störungen</a:t>
+              <a:t>Unterrichtsstörungen</a:t>
             </a:r>
           </a:p>
         </p:txBody>
@@ -4279,14 +4279,14 @@
           <p:nvPr>
             <p:extLst>
               <p:ext uri="{D42A27DB-BD31-4B8C-83A1-F6EECF244321}">
-                <p14:modId xmlns:p14="http://schemas.microsoft.com/office/powerpoint/2010/main" val="2364972200"/>
+                <p14:modId xmlns:p14="http://schemas.microsoft.com/office/powerpoint/2010/main" val="291788661"/>
               </p:ext>
             </p:extLst>
           </p:nvPr>
         </p:nvGraphicFramePr>
         <p:xfrm>
-          <a:off x="243052" y="1067123"/>
-          <a:ext cx="11705895" cy="4051740"/>
+          <a:off x="245097" y="187941"/>
+          <a:ext cx="11703849" cy="5695830"/>
         </p:xfrm>
         <a:graphic>
           <a:graphicData uri="http://schemas.openxmlformats.org/drawingml/2006/table">
@@ -4295,21 +4295,21 @@
                 <a:tableStyleId>{5C22544A-7EE6-4342-B048-85BDC9FD1C3A}</a:tableStyleId>
               </a:tblPr>
               <a:tblGrid>
-                <a:gridCol w="3901965">
+                <a:gridCol w="3901283">
                   <a:extLst>
                     <a:ext uri="{9D8B030D-6E8A-4147-A177-3AD203B41FA5}">
                       <a16:colId xmlns:a16="http://schemas.microsoft.com/office/drawing/2014/main" val="2418642178"/>
                     </a:ext>
                   </a:extLst>
                 </a:gridCol>
-                <a:gridCol w="3901965">
+                <a:gridCol w="3901283">
                   <a:extLst>
                     <a:ext uri="{9D8B030D-6E8A-4147-A177-3AD203B41FA5}">
                       <a16:colId xmlns:a16="http://schemas.microsoft.com/office/drawing/2014/main" val="576198228"/>
                     </a:ext>
                   </a:extLst>
                 </a:gridCol>
-                <a:gridCol w="3901965">
+                <a:gridCol w="3901283">
                   <a:extLst>
                     <a:ext uri="{9D8B030D-6E8A-4147-A177-3AD203B41FA5}">
                       <a16:colId xmlns:a16="http://schemas.microsoft.com/office/drawing/2014/main" val="924655872"/>
@@ -4317,7 +4317,7 @@
                   </a:extLst>
                 </a:gridCol>
               </a:tblGrid>
-              <a:tr h="1095705">
+              <a:tr h="1540313">
                 <a:tc>
                   <a:txBody>
                     <a:bodyPr/>
@@ -4325,7 +4325,7 @@
                     <a:p>
                       <a:pPr algn="ctr"/>
                       <a:r>
-                        <a:rPr lang="de-DE" sz="4000" dirty="0"/>
+                        <a:rPr lang="de-DE" sz="4800" dirty="0"/>
                         <a:t>Person B</a:t>
                       </a:r>
                     </a:p>
@@ -4339,7 +4339,7 @@
                     <a:p>
                       <a:pPr algn="ctr"/>
                       <a:r>
-                        <a:rPr lang="de-DE" sz="4000" dirty="0"/>
+                        <a:rPr lang="de-DE" sz="4800" dirty="0"/>
                         <a:t>Person C</a:t>
                       </a:r>
                     </a:p>
@@ -4353,7 +4353,7 @@
                     <a:p>
                       <a:pPr algn="ctr"/>
                       <a:r>
-                        <a:rPr lang="de-DE" sz="4000" dirty="0"/>
+                        <a:rPr lang="de-DE" sz="4800" dirty="0"/>
                         <a:t>Person D</a:t>
                       </a:r>
                     </a:p>
@@ -4366,7 +4366,7 @@
                   </a:ext>
                 </a:extLst>
               </a:tr>
-              <a:tr h="2956035">
+              <a:tr h="4155517">
                 <a:tc>
                   <a:txBody>
                     <a:bodyPr/>
@@ -4424,8 +4424,8 @@
         </p:nvSpPr>
         <p:spPr>
           <a:xfrm>
-            <a:off x="8313945" y="2562230"/>
-            <a:ext cx="3355781" cy="2308324"/>
+            <a:off x="4358983" y="2260430"/>
+            <a:ext cx="3355781" cy="3416320"/>
           </a:xfrm>
           <a:prstGeom prst="rect">
             <a:avLst/>
@@ -4439,43 +4439,14 @@
           <a:lstStyle/>
           <a:p>
             <a:r>
-              <a:rPr lang="de-DE" sz="4800" dirty="0"/>
-              <a:t>legt Kopf auf Bank und schläft</a:t>
-            </a:r>
-          </a:p>
-        </p:txBody>
-      </p:sp>
-      <p:sp>
-        <p:nvSpPr>
-          <p:cNvPr id="2" name="Textfeld 1">
-            <a:extLst>
-              <a:ext uri="{FF2B5EF4-FFF2-40B4-BE49-F238E27FC236}">
-                <a16:creationId xmlns:a16="http://schemas.microsoft.com/office/drawing/2014/main" id="{66481C0A-9CA7-4557-93EF-2E86A2973C59}"/>
-              </a:ext>
-            </a:extLst>
-          </p:cNvPr>
-          <p:cNvSpPr txBox="1"/>
-          <p:nvPr/>
-        </p:nvSpPr>
-        <p:spPr>
-          <a:xfrm>
-            <a:off x="9697730" y="5883770"/>
-            <a:ext cx="2251217" cy="646331"/>
-          </a:xfrm>
-          <a:prstGeom prst="rect">
-            <a:avLst/>
-          </a:prstGeom>
-          <a:noFill/>
-        </p:spPr>
-        <p:txBody>
-          <a:bodyPr wrap="square" rtlCol="0">
-            <a:spAutoFit/>
-          </a:bodyPr>
-          <a:lstStyle/>
-          <a:p>
-            <a:r>
-              <a:rPr lang="de-DE" dirty="0"/>
-              <a:t>Minute 00:01 – 00:04	</a:t>
+              <a:rPr lang="de-DE" sz="5400" dirty="0"/>
+              <a:t>ruft laut in die Klasse:</a:t>
+            </a:r>
+          </a:p>
+          <a:p>
+            <a:r>
+              <a:rPr lang="de-DE" sz="5400" dirty="0"/>
+              <a:t>„Ich muss mal!“</a:t>
             </a:r>
           </a:p>
         </p:txBody>
@@ -4494,8 +4465,8 @@
         </p:nvSpPr>
         <p:spPr>
           <a:xfrm>
-            <a:off x="522274" y="2423730"/>
-            <a:ext cx="3559532" cy="2585323"/>
+            <a:off x="522274" y="2260430"/>
+            <a:ext cx="3559532" cy="3416320"/>
           </a:xfrm>
           <a:prstGeom prst="rect">
             <a:avLst/>
@@ -4509,12 +4480,9 @@
           <a:lstStyle/>
           <a:p>
             <a:r>
-              <a:rPr lang="de-DE" sz="4800" dirty="0"/>
+              <a:rPr lang="de-DE" sz="5400" dirty="0"/>
               <a:t>trommelt mit Händen auf dem Tisch</a:t>
             </a:r>
-          </a:p>
-          <a:p>
-            <a:endParaRPr lang="de-DE" dirty="0"/>
           </a:p>
         </p:txBody>
       </p:sp>
@@ -4532,8 +4500,8 @@
         </p:nvSpPr>
         <p:spPr>
           <a:xfrm>
-            <a:off x="4543809" y="2192897"/>
-            <a:ext cx="2968902" cy="3046988"/>
+            <a:off x="8241938" y="2260430"/>
+            <a:ext cx="3179834" cy="3416320"/>
           </a:xfrm>
           <a:prstGeom prst="rect">
             <a:avLst/>
@@ -4547,14 +4515,43 @@
           <a:lstStyle/>
           <a:p>
             <a:r>
-              <a:rPr lang="de-DE" sz="4800" dirty="0"/>
-              <a:t>ruft laut in die Klasse:</a:t>
-            </a:r>
-          </a:p>
-          <a:p>
-            <a:r>
-              <a:rPr lang="de-DE" sz="4800" dirty="0"/>
-              <a:t>„Ich muss mal!“</a:t>
+              <a:rPr lang="de-DE" sz="5400" dirty="0"/>
+              <a:t>legt Kopf auf Bank und schläft</a:t>
+            </a:r>
+          </a:p>
+        </p:txBody>
+      </p:sp>
+      <p:sp>
+        <p:nvSpPr>
+          <p:cNvPr id="10" name="Textfeld 9">
+            <a:extLst>
+              <a:ext uri="{FF2B5EF4-FFF2-40B4-BE49-F238E27FC236}">
+                <a16:creationId xmlns:a16="http://schemas.microsoft.com/office/drawing/2014/main" id="{1B369481-4B62-417F-8A8F-B908D9D83D28}"/>
+              </a:ext>
+            </a:extLst>
+          </p:cNvPr>
+          <p:cNvSpPr txBox="1"/>
+          <p:nvPr/>
+        </p:nvSpPr>
+        <p:spPr>
+          <a:xfrm>
+            <a:off x="9326881" y="6485393"/>
+            <a:ext cx="2807658" cy="646331"/>
+          </a:xfrm>
+          <a:prstGeom prst="rect">
+            <a:avLst/>
+          </a:prstGeom>
+          <a:noFill/>
+        </p:spPr>
+        <p:txBody>
+          <a:bodyPr wrap="square" rtlCol="0">
+            <a:spAutoFit/>
+          </a:bodyPr>
+          <a:lstStyle/>
+          <a:p>
+            <a:r>
+              <a:rPr lang="de-DE" dirty="0"/>
+              <a:t>Minute 00:04 – 00:07 Folie I	</a:t>
             </a:r>
           </a:p>
         </p:txBody>
@@ -4774,14 +4771,14 @@
           <p:nvPr>
             <p:extLst>
               <p:ext uri="{D42A27DB-BD31-4B8C-83A1-F6EECF244321}">
-                <p14:modId xmlns:p14="http://schemas.microsoft.com/office/powerpoint/2010/main" val="1381416025"/>
+                <p14:modId xmlns:p14="http://schemas.microsoft.com/office/powerpoint/2010/main" val="1682941494"/>
               </p:ext>
             </p:extLst>
           </p:nvPr>
         </p:nvGraphicFramePr>
         <p:xfrm>
-          <a:off x="243052" y="1067123"/>
-          <a:ext cx="11705895" cy="4051740"/>
+          <a:off x="245097" y="187941"/>
+          <a:ext cx="11703849" cy="5695830"/>
         </p:xfrm>
         <a:graphic>
           <a:graphicData uri="http://schemas.openxmlformats.org/drawingml/2006/table">
@@ -4790,21 +4787,21 @@
                 <a:tableStyleId>{5C22544A-7EE6-4342-B048-85BDC9FD1C3A}</a:tableStyleId>
               </a:tblPr>
               <a:tblGrid>
-                <a:gridCol w="3901965">
+                <a:gridCol w="3901283">
                   <a:extLst>
                     <a:ext uri="{9D8B030D-6E8A-4147-A177-3AD203B41FA5}">
                       <a16:colId xmlns:a16="http://schemas.microsoft.com/office/drawing/2014/main" val="2418642178"/>
                     </a:ext>
                   </a:extLst>
                 </a:gridCol>
-                <a:gridCol w="3901965">
+                <a:gridCol w="3901283">
                   <a:extLst>
                     <a:ext uri="{9D8B030D-6E8A-4147-A177-3AD203B41FA5}">
                       <a16:colId xmlns:a16="http://schemas.microsoft.com/office/drawing/2014/main" val="576198228"/>
                     </a:ext>
                   </a:extLst>
                 </a:gridCol>
-                <a:gridCol w="3901965">
+                <a:gridCol w="3901283">
                   <a:extLst>
                     <a:ext uri="{9D8B030D-6E8A-4147-A177-3AD203B41FA5}">
                       <a16:colId xmlns:a16="http://schemas.microsoft.com/office/drawing/2014/main" val="924655872"/>
@@ -4812,7 +4809,7 @@
                   </a:extLst>
                 </a:gridCol>
               </a:tblGrid>
-              <a:tr h="1095705">
+              <a:tr h="1540313">
                 <a:tc>
                   <a:txBody>
                     <a:bodyPr/>
@@ -4820,7 +4817,7 @@
                     <a:p>
                       <a:pPr algn="ctr"/>
                       <a:r>
-                        <a:rPr lang="de-DE" sz="4000" dirty="0"/>
+                        <a:rPr lang="de-DE" sz="4800" dirty="0"/>
                         <a:t>Person B</a:t>
                       </a:r>
                     </a:p>
@@ -4834,7 +4831,7 @@
                     <a:p>
                       <a:pPr algn="ctr"/>
                       <a:r>
-                        <a:rPr lang="de-DE" sz="4000" dirty="0"/>
+                        <a:rPr lang="de-DE" sz="4800" dirty="0"/>
                         <a:t>Person C</a:t>
                       </a:r>
                     </a:p>
@@ -4848,7 +4845,7 @@
                     <a:p>
                       <a:pPr algn="ctr"/>
                       <a:r>
-                        <a:rPr lang="de-DE" sz="4000" dirty="0"/>
+                        <a:rPr lang="de-DE" sz="4800" dirty="0"/>
                         <a:t>Person D</a:t>
                       </a:r>
                     </a:p>
@@ -4861,7 +4858,7 @@
                   </a:ext>
                 </a:extLst>
               </a:tr>
-              <a:tr h="2956035">
+              <a:tr h="4155517">
                 <a:tc>
                   <a:txBody>
                     <a:bodyPr/>
@@ -4907,10 +4904,10 @@
       </p:graphicFrame>
       <p:sp>
         <p:nvSpPr>
-          <p:cNvPr id="10" name="Textfeld 9">
+          <p:cNvPr id="13" name="Textfeld 12">
             <a:extLst>
               <a:ext uri="{FF2B5EF4-FFF2-40B4-BE49-F238E27FC236}">
-                <a16:creationId xmlns:a16="http://schemas.microsoft.com/office/drawing/2014/main" id="{ECB736A4-6414-4736-AFC4-E07DEBBD3690}"/>
+                <a16:creationId xmlns:a16="http://schemas.microsoft.com/office/drawing/2014/main" id="{1DC30DDC-9BBC-45F8-A7BD-0AB20420B4A2}"/>
               </a:ext>
             </a:extLst>
           </p:cNvPr>
@@ -4919,8 +4916,8 @@
         </p:nvSpPr>
         <p:spPr>
           <a:xfrm>
-            <a:off x="8257838" y="2177329"/>
-            <a:ext cx="3691106" cy="3323987"/>
+            <a:off x="8151557" y="1706432"/>
+            <a:ext cx="3335918" cy="4247317"/>
           </a:xfrm>
           <a:prstGeom prst="rect">
             <a:avLst/>
@@ -4934,21 +4931,18 @@
           <a:lstStyle/>
           <a:p>
             <a:r>
-              <a:rPr lang="de-DE" sz="4800" dirty="0"/>
-              <a:t>meldet sich schnipsend und stellt Frage</a:t>
-            </a:r>
-          </a:p>
-          <a:p>
-            <a:endParaRPr lang="de-DE" dirty="0"/>
-          </a:p>
-        </p:txBody>
-      </p:sp>
-      <p:sp>
-        <p:nvSpPr>
-          <p:cNvPr id="12" name="Textfeld 11">
+              <a:rPr lang="de-DE" sz="5400" dirty="0"/>
+              <a:t>meldet sich schnipsend und stellt eine Frage</a:t>
+            </a:r>
+          </a:p>
+        </p:txBody>
+      </p:sp>
+      <p:sp>
+        <p:nvSpPr>
+          <p:cNvPr id="7" name="Textfeld 6">
             <a:extLst>
               <a:ext uri="{FF2B5EF4-FFF2-40B4-BE49-F238E27FC236}">
-                <a16:creationId xmlns:a16="http://schemas.microsoft.com/office/drawing/2014/main" id="{D9CA8BF7-66D4-4E8C-AF2D-40B2E1A475F0}"/>
+                <a16:creationId xmlns:a16="http://schemas.microsoft.com/office/drawing/2014/main" id="{7F02EB6C-9884-4113-A7A0-3A8DD76BE44D}"/>
               </a:ext>
             </a:extLst>
           </p:cNvPr>
@@ -4957,8 +4951,8 @@
         </p:nvSpPr>
         <p:spPr>
           <a:xfrm>
-            <a:off x="578379" y="2367171"/>
-            <a:ext cx="3355781" cy="2308324"/>
+            <a:off x="500329" y="2121930"/>
+            <a:ext cx="3340152" cy="3416320"/>
           </a:xfrm>
           <a:prstGeom prst="rect">
             <a:avLst/>
@@ -4972,18 +4966,18 @@
           <a:lstStyle/>
           <a:p>
             <a:r>
-              <a:rPr lang="de-DE" sz="4800" dirty="0"/>
-              <a:t>kritzelt auf Arbeitsblatt herum </a:t>
-            </a:r>
-          </a:p>
-        </p:txBody>
-      </p:sp>
-      <p:sp>
-        <p:nvSpPr>
-          <p:cNvPr id="2" name="Textfeld 1">
+              <a:rPr lang="de-DE" sz="5400" dirty="0"/>
+              <a:t>kritzelt auf Arbeits-blatt herum </a:t>
+            </a:r>
+          </a:p>
+        </p:txBody>
+      </p:sp>
+      <p:sp>
+        <p:nvSpPr>
+          <p:cNvPr id="8" name="Textfeld 7">
             <a:extLst>
               <a:ext uri="{FF2B5EF4-FFF2-40B4-BE49-F238E27FC236}">
-                <a16:creationId xmlns:a16="http://schemas.microsoft.com/office/drawing/2014/main" id="{66481C0A-9CA7-4557-93EF-2E86A2973C59}"/>
+                <a16:creationId xmlns:a16="http://schemas.microsoft.com/office/drawing/2014/main" id="{B204C9F2-1ACC-45D3-BDD4-AE831F417A49}"/>
               </a:ext>
             </a:extLst>
           </p:cNvPr>
@@ -4992,8 +4986,8 @@
         </p:nvSpPr>
         <p:spPr>
           <a:xfrm>
-            <a:off x="9697730" y="5883770"/>
-            <a:ext cx="2251217" cy="646331"/>
+            <a:off x="4358983" y="1953191"/>
+            <a:ext cx="3792574" cy="3416320"/>
           </a:xfrm>
           <a:prstGeom prst="rect">
             <a:avLst/>
@@ -5007,18 +5001,18 @@
           <a:lstStyle/>
           <a:p>
             <a:r>
-              <a:rPr lang="de-DE" dirty="0"/>
-              <a:t>Minute 00:04 – 00:07	</a:t>
-            </a:r>
-          </a:p>
-        </p:txBody>
-      </p:sp>
-      <p:sp>
-        <p:nvSpPr>
-          <p:cNvPr id="5" name="Textfeld 4">
+              <a:rPr lang="de-DE" sz="5400" dirty="0"/>
+              <a:t>dreht sich um und starrt aus dem Fenster</a:t>
+            </a:r>
+          </a:p>
+        </p:txBody>
+      </p:sp>
+      <p:sp>
+        <p:nvSpPr>
+          <p:cNvPr id="11" name="Textfeld 10">
             <a:extLst>
               <a:ext uri="{FF2B5EF4-FFF2-40B4-BE49-F238E27FC236}">
-                <a16:creationId xmlns:a16="http://schemas.microsoft.com/office/drawing/2014/main" id="{D4B7BFFA-29C7-499B-943B-99807948A071}"/>
+                <a16:creationId xmlns:a16="http://schemas.microsoft.com/office/drawing/2014/main" id="{E4E3FF3C-9D3A-422A-88B8-88035DD7A4B4}"/>
               </a:ext>
             </a:extLst>
           </p:cNvPr>
@@ -5027,8 +5021,8 @@
         </p:nvSpPr>
         <p:spPr>
           <a:xfrm>
-            <a:off x="4356754" y="2184291"/>
-            <a:ext cx="3478490" cy="3046988"/>
+            <a:off x="9326881" y="6485393"/>
+            <a:ext cx="2865120" cy="646331"/>
           </a:xfrm>
           <a:prstGeom prst="rect">
             <a:avLst/>
@@ -5042,8 +5036,8 @@
           <a:lstStyle/>
           <a:p>
             <a:r>
-              <a:rPr lang="de-DE" sz="4800" dirty="0"/>
-              <a:t>steht in der Klasse auf und geht herum</a:t>
+              <a:rPr lang="de-DE" dirty="0"/>
+              <a:t>Minute 00:07 – 00:10 Folie II	</a:t>
             </a:r>
           </a:p>
         </p:txBody>
@@ -5051,7 +5045,7 @@
     </p:spTree>
     <p:extLst>
       <p:ext uri="{BB962C8B-B14F-4D97-AF65-F5344CB8AC3E}">
-        <p14:creationId xmlns:p14="http://schemas.microsoft.com/office/powerpoint/2010/main" val="480364169"/>
+        <p14:creationId xmlns:p14="http://schemas.microsoft.com/office/powerpoint/2010/main" val="1054434840"/>
       </p:ext>
     </p:extLst>
   </p:cSld>
@@ -5092,7 +5086,7 @@
                                           </p:stCondLst>
                                         </p:cTn>
                                         <p:tgtEl>
-                                          <p:spTgt spid="12"/>
+                                          <p:spTgt spid="7"/>
                                         </p:tgtEl>
                                         <p:attrNameLst>
                                           <p:attrName>style.visibility</p:attrName>
@@ -5137,7 +5131,7 @@
                                           </p:stCondLst>
                                         </p:cTn>
                                         <p:tgtEl>
-                                          <p:spTgt spid="5"/>
+                                          <p:spTgt spid="8"/>
                                         </p:tgtEl>
                                         <p:attrNameLst>
                                           <p:attrName>style.visibility</p:attrName>
@@ -5182,7 +5176,7 @@
                                           </p:stCondLst>
                                         </p:cTn>
                                         <p:tgtEl>
-                                          <p:spTgt spid="10"/>
+                                          <p:spTgt spid="13"/>
                                         </p:tgtEl>
                                         <p:attrNameLst>
                                           <p:attrName>style.visibility</p:attrName>
@@ -5223,9 +5217,9 @@
       </p:par>
     </p:tnLst>
     <p:bldLst>
-      <p:bldP spid="10" grpId="0"/>
-      <p:bldP spid="12" grpId="0"/>
-      <p:bldP spid="5" grpId="0"/>
+      <p:bldP spid="13" grpId="0"/>
+      <p:bldP spid="7" grpId="0"/>
+      <p:bldP spid="8" grpId="0"/>
     </p:bldLst>
   </p:timing>
 </p:sld>
@@ -5263,14 +5257,14 @@
           <p:nvPr>
             <p:extLst>
               <p:ext uri="{D42A27DB-BD31-4B8C-83A1-F6EECF244321}">
-                <p14:modId xmlns:p14="http://schemas.microsoft.com/office/powerpoint/2010/main" val="3736762754"/>
+                <p14:modId xmlns:p14="http://schemas.microsoft.com/office/powerpoint/2010/main" val="3263650637"/>
               </p:ext>
             </p:extLst>
           </p:nvPr>
         </p:nvGraphicFramePr>
         <p:xfrm>
-          <a:off x="243052" y="1067123"/>
-          <a:ext cx="11705895" cy="4051740"/>
+          <a:off x="245097" y="187941"/>
+          <a:ext cx="11703849" cy="5695830"/>
         </p:xfrm>
         <a:graphic>
           <a:graphicData uri="http://schemas.openxmlformats.org/drawingml/2006/table">
@@ -5279,21 +5273,21 @@
                 <a:tableStyleId>{5C22544A-7EE6-4342-B048-85BDC9FD1C3A}</a:tableStyleId>
               </a:tblPr>
               <a:tblGrid>
-                <a:gridCol w="3901965">
+                <a:gridCol w="3901283">
                   <a:extLst>
                     <a:ext uri="{9D8B030D-6E8A-4147-A177-3AD203B41FA5}">
                       <a16:colId xmlns:a16="http://schemas.microsoft.com/office/drawing/2014/main" val="2418642178"/>
                     </a:ext>
                   </a:extLst>
                 </a:gridCol>
-                <a:gridCol w="3901965">
+                <a:gridCol w="3901283">
                   <a:extLst>
                     <a:ext uri="{9D8B030D-6E8A-4147-A177-3AD203B41FA5}">
                       <a16:colId xmlns:a16="http://schemas.microsoft.com/office/drawing/2014/main" val="576198228"/>
                     </a:ext>
                   </a:extLst>
                 </a:gridCol>
-                <a:gridCol w="3901965">
+                <a:gridCol w="3901283">
                   <a:extLst>
                     <a:ext uri="{9D8B030D-6E8A-4147-A177-3AD203B41FA5}">
                       <a16:colId xmlns:a16="http://schemas.microsoft.com/office/drawing/2014/main" val="924655872"/>
@@ -5301,7 +5295,7 @@
                   </a:extLst>
                 </a:gridCol>
               </a:tblGrid>
-              <a:tr h="1095705">
+              <a:tr h="1540313">
                 <a:tc>
                   <a:txBody>
                     <a:bodyPr/>
@@ -5309,7 +5303,7 @@
                     <a:p>
                       <a:pPr algn="ctr"/>
                       <a:r>
-                        <a:rPr lang="de-DE" sz="4000" dirty="0"/>
+                        <a:rPr lang="de-DE" sz="4800" dirty="0"/>
                         <a:t>Person B</a:t>
                       </a:r>
                     </a:p>
@@ -5323,7 +5317,7 @@
                     <a:p>
                       <a:pPr algn="ctr"/>
                       <a:r>
-                        <a:rPr lang="de-DE" sz="4000" dirty="0"/>
+                        <a:rPr lang="de-DE" sz="4800" dirty="0"/>
                         <a:t>Person C</a:t>
                       </a:r>
                     </a:p>
@@ -5337,7 +5331,7 @@
                     <a:p>
                       <a:pPr algn="ctr"/>
                       <a:r>
-                        <a:rPr lang="de-DE" sz="4000" dirty="0"/>
+                        <a:rPr lang="de-DE" sz="4800" dirty="0"/>
                         <a:t>Person D</a:t>
                       </a:r>
                     </a:p>
@@ -5350,7 +5344,7 @@
                   </a:ext>
                 </a:extLst>
               </a:tr>
-              <a:tr h="2956035">
+              <a:tr h="4155517">
                 <a:tc>
                   <a:txBody>
                     <a:bodyPr/>
@@ -5396,10 +5390,10 @@
       </p:graphicFrame>
       <p:sp>
         <p:nvSpPr>
-          <p:cNvPr id="10" name="Textfeld 9">
+          <p:cNvPr id="13" name="Textfeld 12">
             <a:extLst>
               <a:ext uri="{FF2B5EF4-FFF2-40B4-BE49-F238E27FC236}">
-                <a16:creationId xmlns:a16="http://schemas.microsoft.com/office/drawing/2014/main" id="{ECB736A4-6414-4736-AFC4-E07DEBBD3690}"/>
+                <a16:creationId xmlns:a16="http://schemas.microsoft.com/office/drawing/2014/main" id="{1DC30DDC-9BBC-45F8-A7BD-0AB20420B4A2}"/>
               </a:ext>
             </a:extLst>
           </p:cNvPr>
@@ -5408,8 +5402,8 @@
         </p:nvSpPr>
         <p:spPr>
           <a:xfrm>
-            <a:off x="8206633" y="2071875"/>
-            <a:ext cx="3691106" cy="3046988"/>
+            <a:off x="8240198" y="2254421"/>
+            <a:ext cx="3878055" cy="3416320"/>
           </a:xfrm>
           <a:prstGeom prst="rect">
             <a:avLst/>
@@ -5423,7 +5417,7 @@
           <a:lstStyle/>
           <a:p>
             <a:r>
-              <a:rPr lang="de-DE" sz="4800" dirty="0"/>
+              <a:rPr lang="de-DE" sz="5400" dirty="0"/>
               <a:t>klickert nervös mit dem Kugel-schreiben</a:t>
             </a:r>
           </a:p>
@@ -5431,10 +5425,10 @@
       </p:sp>
       <p:sp>
         <p:nvSpPr>
-          <p:cNvPr id="12" name="Textfeld 11">
+          <p:cNvPr id="7" name="Textfeld 6">
             <a:extLst>
               <a:ext uri="{FF2B5EF4-FFF2-40B4-BE49-F238E27FC236}">
-                <a16:creationId xmlns:a16="http://schemas.microsoft.com/office/drawing/2014/main" id="{D9CA8BF7-66D4-4E8C-AF2D-40B2E1A475F0}"/>
+                <a16:creationId xmlns:a16="http://schemas.microsoft.com/office/drawing/2014/main" id="{7F02EB6C-9884-4113-A7A0-3A8DD76BE44D}"/>
               </a:ext>
             </a:extLst>
           </p:cNvPr>
@@ -5443,8 +5437,8 @@
         </p:nvSpPr>
         <p:spPr>
           <a:xfrm>
-            <a:off x="505224" y="2644170"/>
-            <a:ext cx="3355781" cy="1569660"/>
+            <a:off x="514959" y="2263076"/>
+            <a:ext cx="3429529" cy="2585323"/>
           </a:xfrm>
           <a:prstGeom prst="rect">
             <a:avLst/>
@@ -5458,7 +5452,7 @@
           <a:lstStyle/>
           <a:p>
             <a:r>
-              <a:rPr lang="de-DE" sz="4800" dirty="0"/>
+              <a:rPr lang="de-DE" sz="5400" dirty="0"/>
               <a:t>schwatzt mit Nachbar*in</a:t>
             </a:r>
           </a:p>
@@ -5466,10 +5460,10 @@
       </p:sp>
       <p:sp>
         <p:nvSpPr>
-          <p:cNvPr id="2" name="Textfeld 1">
+          <p:cNvPr id="8" name="Textfeld 7">
             <a:extLst>
               <a:ext uri="{FF2B5EF4-FFF2-40B4-BE49-F238E27FC236}">
-                <a16:creationId xmlns:a16="http://schemas.microsoft.com/office/drawing/2014/main" id="{66481C0A-9CA7-4557-93EF-2E86A2973C59}"/>
+                <a16:creationId xmlns:a16="http://schemas.microsoft.com/office/drawing/2014/main" id="{B204C9F2-1ACC-45D3-BDD4-AE831F417A49}"/>
               </a:ext>
             </a:extLst>
           </p:cNvPr>
@@ -5478,8 +5472,8 @@
         </p:nvSpPr>
         <p:spPr>
           <a:xfrm>
-            <a:off x="9697730" y="5883770"/>
-            <a:ext cx="2251217" cy="646331"/>
+            <a:off x="4358983" y="2258427"/>
+            <a:ext cx="3358553" cy="3416320"/>
           </a:xfrm>
           <a:prstGeom prst="rect">
             <a:avLst/>
@@ -5493,22 +5487,18 @@
           <a:lstStyle/>
           <a:p>
             <a:r>
-              <a:rPr lang="de-DE"/>
-              <a:t>Minute 00:07 – 00:10</a:t>
-            </a:r>
-            <a:r>
-              <a:rPr lang="de-DE" dirty="0"/>
-              <a:t>	</a:t>
-            </a:r>
-          </a:p>
-        </p:txBody>
-      </p:sp>
-      <p:sp>
-        <p:nvSpPr>
-          <p:cNvPr id="5" name="Textfeld 4">
+              <a:rPr lang="de-DE" sz="5400" dirty="0"/>
+              <a:t>holt Handy heraus und schaut drauf</a:t>
+            </a:r>
+          </a:p>
+        </p:txBody>
+      </p:sp>
+      <p:sp>
+        <p:nvSpPr>
+          <p:cNvPr id="10" name="Textfeld 9">
             <a:extLst>
               <a:ext uri="{FF2B5EF4-FFF2-40B4-BE49-F238E27FC236}">
-                <a16:creationId xmlns:a16="http://schemas.microsoft.com/office/drawing/2014/main" id="{D4B7BFFA-29C7-499B-943B-99807948A071}"/>
+                <a16:creationId xmlns:a16="http://schemas.microsoft.com/office/drawing/2014/main" id="{AB8EB49B-29C4-4090-9543-980A02E79EBB}"/>
               </a:ext>
             </a:extLst>
           </p:cNvPr>
@@ -5517,8 +5507,8 @@
         </p:nvSpPr>
         <p:spPr>
           <a:xfrm>
-            <a:off x="4356754" y="2423726"/>
-            <a:ext cx="3478490" cy="2308324"/>
+            <a:off x="9231320" y="6485393"/>
+            <a:ext cx="2960680" cy="369332"/>
           </a:xfrm>
           <a:prstGeom prst="rect">
             <a:avLst/>
@@ -5532,8 +5522,8 @@
           <a:lstStyle/>
           <a:p>
             <a:r>
-              <a:rPr lang="de-DE" sz="4800" dirty="0"/>
-              <a:t>holt Handy heraus und schaut drauf</a:t>
+              <a:rPr lang="de-DE" dirty="0"/>
+              <a:t>Minute 00:07 – 00:10 Folie III	</a:t>
             </a:r>
           </a:p>
         </p:txBody>
@@ -5541,7 +5531,7 @@
     </p:spTree>
     <p:extLst>
       <p:ext uri="{BB962C8B-B14F-4D97-AF65-F5344CB8AC3E}">
-        <p14:creationId xmlns:p14="http://schemas.microsoft.com/office/powerpoint/2010/main" val="2830185697"/>
+        <p14:creationId xmlns:p14="http://schemas.microsoft.com/office/powerpoint/2010/main" val="3322342255"/>
       </p:ext>
     </p:extLst>
   </p:cSld>
@@ -5582,7 +5572,7 @@
                                           </p:stCondLst>
                                         </p:cTn>
                                         <p:tgtEl>
-                                          <p:spTgt spid="12"/>
+                                          <p:spTgt spid="7"/>
                                         </p:tgtEl>
                                         <p:attrNameLst>
                                           <p:attrName>style.visibility</p:attrName>
@@ -5627,7 +5617,7 @@
                                           </p:stCondLst>
                                         </p:cTn>
                                         <p:tgtEl>
-                                          <p:spTgt spid="5"/>
+                                          <p:spTgt spid="8"/>
                                         </p:tgtEl>
                                         <p:attrNameLst>
                                           <p:attrName>style.visibility</p:attrName>
@@ -5672,7 +5662,7 @@
                                           </p:stCondLst>
                                         </p:cTn>
                                         <p:tgtEl>
-                                          <p:spTgt spid="10"/>
+                                          <p:spTgt spid="13"/>
                                         </p:tgtEl>
                                         <p:attrNameLst>
                                           <p:attrName>style.visibility</p:attrName>
@@ -5713,9 +5703,9 @@
       </p:par>
     </p:tnLst>
     <p:bldLst>
-      <p:bldP spid="10" grpId="0"/>
-      <p:bldP spid="12" grpId="0"/>
-      <p:bldP spid="5" grpId="0"/>
+      <p:bldP spid="13" grpId="0"/>
+      <p:bldP spid="7" grpId="0"/>
+      <p:bldP spid="8" grpId="0"/>
     </p:bldLst>
   </p:timing>
 </p:sld>
@@ -5814,7 +5804,7 @@
         </p:nvSpPr>
         <p:spPr>
           <a:xfrm>
-            <a:off x="1915128" y="1788454"/>
+            <a:off x="1160984" y="2127819"/>
             <a:ext cx="8830901" cy="3173160"/>
           </a:xfrm>
         </p:spPr>

</xml_diff>